<commit_message>
fixed image loading issue and naming convention
</commit_message>
<xml_diff>
--- a/Phase_1/Phase1.pptx
+++ b/Phase_1/Phase1.pptx
@@ -2,34 +2,34 @@
 <file path=ppt/presentation.xml><?xml version="1.0" encoding="utf-8"?>
 <p:presentation xmlns:a="http://schemas.openxmlformats.org/drawingml/2006/main" xmlns:r="http://schemas.openxmlformats.org/officeDocument/2006/relationships" xmlns:mc="http://schemas.openxmlformats.org/markup-compatibility/2006" xmlns:mv="urn:schemas-microsoft-com:mac:vml" xmlns:p="http://schemas.openxmlformats.org/presentationml/2006/main" xmlns:c="http://schemas.openxmlformats.org/drawingml/2006/chart" xmlns:dgm="http://schemas.openxmlformats.org/drawingml/2006/diagram" xmlns:o="urn:schemas-microsoft-com:office:office" xmlns:v="urn:schemas-microsoft-com:vml" xmlns:pvml="urn:schemas-microsoft-com:office:powerpoint" xmlns:com="http://schemas.openxmlformats.org/drawingml/2006/compatibility" xmlns:p14="http://schemas.microsoft.com/office/powerpoint/2010/main" xmlns:p15="http://schemas.microsoft.com/office/powerpoint/2012/main" xmlns:ahyp="http://schemas.microsoft.com/office/drawing/2018/hyperlinkcolor" autoCompressPictures="0" embedTrueTypeFonts="1" strictFirstAndLastChars="0" saveSubsetFonts="1">
   <p:sldMasterIdLst>
-    <p:sldMasterId id="2147483659" r:id="rId5"/>
+    <p:sldMasterId id="2147483659" r:id="rId4"/>
   </p:sldMasterIdLst>
   <p:notesMasterIdLst>
-    <p:notesMasterId r:id="rId6"/>
+    <p:notesMasterId r:id="rId5"/>
   </p:notesMasterIdLst>
   <p:sldIdLst>
-    <p:sldId id="256" r:id="rId7"/>
-    <p:sldId id="257" r:id="rId8"/>
-    <p:sldId id="258" r:id="rId9"/>
-    <p:sldId id="259" r:id="rId10"/>
-    <p:sldId id="260" r:id="rId11"/>
-    <p:sldId id="261" r:id="rId12"/>
-    <p:sldId id="262" r:id="rId13"/>
+    <p:sldId id="256" r:id="rId6"/>
+    <p:sldId id="257" r:id="rId7"/>
+    <p:sldId id="258" r:id="rId8"/>
+    <p:sldId id="259" r:id="rId9"/>
+    <p:sldId id="260" r:id="rId10"/>
+    <p:sldId id="261" r:id="rId11"/>
+    <p:sldId id="262" r:id="rId12"/>
   </p:sldIdLst>
   <p:sldSz cy="5143500" cx="9144000"/>
   <p:notesSz cx="6858000" cy="9144000"/>
   <p:embeddedFontLst>
     <p:embeddedFont>
       <p:font typeface="PT Sans Narrow"/>
-      <p:regular r:id="rId14"/>
-      <p:bold r:id="rId15"/>
+      <p:regular r:id="rId13"/>
+      <p:bold r:id="rId14"/>
     </p:embeddedFont>
     <p:embeddedFont>
       <p:font typeface="Open Sans"/>
-      <p:regular r:id="rId16"/>
-      <p:bold r:id="rId17"/>
-      <p:italic r:id="rId18"/>
-      <p:boldItalic r:id="rId19"/>
+      <p:regular r:id="rId15"/>
+      <p:bold r:id="rId16"/>
+      <p:italic r:id="rId17"/>
+      <p:boldItalic r:id="rId18"/>
     </p:embeddedFont>
   </p:embeddedFontLst>
   <p:defaultTextStyle>
@@ -278,21 +278,6 @@
     </p:ext>
   </p:extLst>
 </p:presentation>
-</file>
-
-<file path=ppt/commentAuthors.xml><?xml version="1.0" encoding="utf-8"?>
-<p:cmAuthorLst xmlns:a="http://schemas.openxmlformats.org/drawingml/2006/main" xmlns:r="http://schemas.openxmlformats.org/officeDocument/2006/relationships" xmlns:mc="http://schemas.openxmlformats.org/markup-compatibility/2006" xmlns:mv="urn:schemas-microsoft-com:mac:vml" xmlns:p="http://schemas.openxmlformats.org/presentationml/2006/main" xmlns:c="http://schemas.openxmlformats.org/drawingml/2006/chart" xmlns:dgm="http://schemas.openxmlformats.org/drawingml/2006/diagram" xmlns:o="urn:schemas-microsoft-com:office:office" xmlns:v="urn:schemas-microsoft-com:vml" xmlns:pvml="urn:schemas-microsoft-com:office:powerpoint" xmlns:com="http://schemas.openxmlformats.org/drawingml/2006/compatibility" xmlns:p14="http://schemas.microsoft.com/office/powerpoint/2010/main" xmlns:p15="http://schemas.microsoft.com/office/powerpoint/2012/main" xmlns:ahyp="http://schemas.microsoft.com/office/drawing/2018/hyperlinkcolor">
-  <p:cmAuthor clrIdx="0" id="0" initials="" lastIdx="1" name="Yoan Palacios"/>
-</p:cmAuthorLst>
-</file>
-
-<file path=ppt/comments/comment1.xml><?xml version="1.0" encoding="utf-8"?>
-<p:cmLst xmlns:a="http://schemas.openxmlformats.org/drawingml/2006/main" xmlns:r="http://schemas.openxmlformats.org/officeDocument/2006/relationships" xmlns:mc="http://schemas.openxmlformats.org/markup-compatibility/2006" xmlns:mv="urn:schemas-microsoft-com:mac:vml" xmlns:p="http://schemas.openxmlformats.org/presentationml/2006/main" xmlns:c="http://schemas.openxmlformats.org/drawingml/2006/chart" xmlns:dgm="http://schemas.openxmlformats.org/drawingml/2006/diagram" xmlns:o="urn:schemas-microsoft-com:office:office" xmlns:v="urn:schemas-microsoft-com:vml" xmlns:pvml="urn:schemas-microsoft-com:office:powerpoint" xmlns:com="http://schemas.openxmlformats.org/drawingml/2006/compatibility" xmlns:p14="http://schemas.microsoft.com/office/powerpoint/2010/main" xmlns:p15="http://schemas.microsoft.com/office/powerpoint/2012/main" xmlns:ahyp="http://schemas.microsoft.com/office/drawing/2018/hyperlinkcolor">
-  <p:cm authorId="0" idx="1" dt="2021-10-20T16:00:23.444">
-    <p:pos x="2978" y="1110"/>
-    <p:text>What does this mean?</p:text>
-  </p:cm>
-</p:cmLst>
 </file>
 
 <file path=ppt/notesMasters/notesMaster1.xml><?xml version="1.0" encoding="utf-8"?>
@@ -7498,19 +7483,7 @@
                 <a:cs typeface="Arial"/>
                 <a:sym typeface="Arial"/>
               </a:rPr>
-              <a:t>c.    </a:t>
-            </a:r>
-            <a:r>
-              <a:rPr lang="en" sz="1200">
-                <a:solidFill>
-                  <a:srgbClr val="000000"/>
-                </a:solidFill>
-                <a:latin typeface="Arial"/>
-                <a:ea typeface="Arial"/>
-                <a:cs typeface="Arial"/>
-                <a:sym typeface="Arial"/>
-              </a:rPr>
-              <a:t>Can view per Hospital</a:t>
+              <a:t>c.    Number of Nurses per Hospital</a:t>
             </a:r>
             <a:endParaRPr sz="1200">
               <a:solidFill>
@@ -7542,39 +7515,7 @@
                 <a:cs typeface="Arial"/>
                 <a:sym typeface="Arial"/>
               </a:rPr>
-              <a:t>d.    Number of Nurses per Hospital</a:t>
-            </a:r>
-            <a:endParaRPr sz="1200">
-              <a:solidFill>
-                <a:srgbClr val="000000"/>
-              </a:solidFill>
-              <a:latin typeface="Arial"/>
-              <a:ea typeface="Arial"/>
-              <a:cs typeface="Arial"/>
-              <a:sym typeface="Arial"/>
-            </a:endParaRPr>
-          </a:p>
-          <a:p>
-            <a:pPr indent="457200" lvl="0" marL="0" rtl="0" algn="l">
-              <a:spcBef>
-                <a:spcPts val="1200"/>
-              </a:spcBef>
-              <a:spcAft>
-                <a:spcPts val="0"/>
-              </a:spcAft>
-              <a:buNone/>
-            </a:pPr>
-            <a:r>
-              <a:rPr lang="en" sz="1200">
-                <a:solidFill>
-                  <a:srgbClr val="000000"/>
-                </a:solidFill>
-                <a:latin typeface="Arial"/>
-                <a:ea typeface="Arial"/>
-                <a:cs typeface="Arial"/>
-                <a:sym typeface="Arial"/>
-              </a:rPr>
-              <a:t>e.    Number of Doctors per Hospital</a:t>
+              <a:t>d.    Number of Doctors per Hospital</a:t>
             </a:r>
             <a:endParaRPr sz="1200">
               <a:solidFill>
@@ -7606,7 +7547,7 @@
                 <a:cs typeface="Arial"/>
                 <a:sym typeface="Arial"/>
               </a:rPr>
-              <a:t>	f.     Most used medication per Hospital</a:t>
+              <a:t>	e.     Most used medication per Hospital</a:t>
             </a:r>
             <a:endParaRPr sz="1200">
               <a:solidFill>
@@ -7984,7 +7925,7 @@
         <p:spPr>
           <a:xfrm>
             <a:off x="152400" y="994875"/>
-            <a:ext cx="8839203" cy="3669198"/>
+            <a:ext cx="8578903" cy="3996227"/>
           </a:xfrm>
           <a:prstGeom prst="rect">
             <a:avLst/>
@@ -8084,7 +8025,7 @@
         <p:spPr>
           <a:xfrm>
             <a:off x="311700" y="1152425"/>
-            <a:ext cx="4624800" cy="2405700"/>
+            <a:ext cx="5304000" cy="2104800"/>
           </a:xfrm>
           <a:prstGeom prst="rect">
             <a:avLst/>
@@ -8154,7 +8095,7 @@
             </a:pPr>
             <a:r>
               <a:rPr lang="en" sz="1700"/>
-              <a:t>Python: Pandas, Numpy, Flask</a:t>
+              <a:t>Python: Pandas, Numpy, Flask, flask_resful</a:t>
             </a:r>
             <a:endParaRPr sz="1700"/>
           </a:p>
@@ -8214,27 +8155,7 @@
             </a:pPr>
             <a:r>
               <a:rPr lang="en" sz="1700"/>
-              <a:t>HTML/CSS, JS</a:t>
-            </a:r>
-            <a:endParaRPr sz="1700"/>
-          </a:p>
-          <a:p>
-            <a:pPr indent="-336550" lvl="2" marL="1371600" rtl="0" algn="l">
-              <a:lnSpc>
-                <a:spcPct val="115000"/>
-              </a:lnSpc>
-              <a:spcBef>
-                <a:spcPts val="0"/>
-              </a:spcBef>
-              <a:spcAft>
-                <a:spcPts val="0"/>
-              </a:spcAft>
-              <a:buSzPts val="1700"/>
-              <a:buChar char="■"/>
-            </a:pPr>
-            <a:r>
-              <a:rPr lang="en" sz="1700"/>
-              <a:t>Bootstrap a design template</a:t>
+              <a:t>React (HTML/CSS)</a:t>
             </a:r>
             <a:endParaRPr sz="1700"/>
           </a:p>
@@ -8312,8 +8233,8 @@
         </p:blipFill>
         <p:spPr>
           <a:xfrm>
-            <a:off x="4642850" y="3372650"/>
-            <a:ext cx="4189450" cy="1583950"/>
+            <a:off x="4693325" y="3190025"/>
+            <a:ext cx="1879626" cy="1879626"/>
           </a:xfrm>
           <a:prstGeom prst="rect">
             <a:avLst/>

</xml_diff>

<commit_message>
fixed additional Naming convention
</commit_message>
<xml_diff>
--- a/Phase_1/Phase1.pptx
+++ b/Phase_1/Phase1.pptx
@@ -7831,8 +7831,8 @@
         </p:blipFill>
         <p:spPr>
           <a:xfrm>
-            <a:off x="152400" y="921100"/>
-            <a:ext cx="8720584" cy="4070001"/>
+            <a:off x="211288" y="768700"/>
+            <a:ext cx="8721430" cy="4070000"/>
           </a:xfrm>
           <a:prstGeom prst="rect">
             <a:avLst/>
@@ -8360,6 +8360,285 @@
 </file>
 
 <file path=ppt/theme/theme1.xml><?xml version="1.0" encoding="utf-8"?>
+<a:theme xmlns:a="http://schemas.openxmlformats.org/drawingml/2006/main" xmlns:r="http://schemas.openxmlformats.org/officeDocument/2006/relationships" name="Tropic">
+  <a:themeElements>
+    <a:clrScheme name="Tropic">
+      <a:dk1>
+        <a:srgbClr val="A1E8D9"/>
+      </a:dk1>
+      <a:lt1>
+        <a:srgbClr val="FFFFFF"/>
+      </a:lt1>
+      <a:dk2>
+        <a:srgbClr val="695D46"/>
+      </a:dk2>
+      <a:lt2>
+        <a:srgbClr val="B3A77D"/>
+      </a:lt2>
+      <a:accent1>
+        <a:srgbClr val="EF6C00"/>
+      </a:accent1>
+      <a:accent2>
+        <a:srgbClr val="CE93D8"/>
+      </a:accent2>
+      <a:accent3>
+        <a:srgbClr val="4DB6AC"/>
+      </a:accent3>
+      <a:accent4>
+        <a:srgbClr val="FF9800"/>
+      </a:accent4>
+      <a:accent5>
+        <a:srgbClr val="009668"/>
+      </a:accent5>
+      <a:accent6>
+        <a:srgbClr val="EEFF41"/>
+      </a:accent6>
+      <a:hlink>
+        <a:srgbClr val="009668"/>
+      </a:hlink>
+      <a:folHlink>
+        <a:srgbClr val="009668"/>
+      </a:folHlink>
+    </a:clrScheme>
+    <a:fontScheme name="Office">
+      <a:majorFont>
+        <a:latin typeface="Arial"/>
+        <a:ea typeface=""/>
+        <a:cs typeface=""/>
+        <a:font script="Jpan" typeface="ＭＳ Ｐゴシック"/>
+        <a:font script="Hang" typeface="맑은 고딕"/>
+        <a:font script="Hans" typeface="宋体"/>
+        <a:font script="Hant" typeface="新細明體"/>
+        <a:font script="Arab" typeface="Times New Roman"/>
+        <a:font script="Hebr" typeface="Times New Roman"/>
+        <a:font script="Thai" typeface="Angsana New"/>
+        <a:font script="Ethi" typeface="Nyala"/>
+        <a:font script="Beng" typeface="Vrinda"/>
+        <a:font script="Gujr" typeface="Shruti"/>
+        <a:font script="Khmr" typeface="MoolBoran"/>
+        <a:font script="Knda" typeface="Tunga"/>
+        <a:font script="Guru" typeface="Raavi"/>
+        <a:font script="Cans" typeface="Euphemia"/>
+        <a:font script="Cher" typeface="Plantagenet Cherokee"/>
+        <a:font script="Yiii" typeface="Microsoft Yi Baiti"/>
+        <a:font script="Tibt" typeface="Microsoft Himalaya"/>
+        <a:font script="Thaa" typeface="MV Boli"/>
+        <a:font script="Deva" typeface="Mangal"/>
+        <a:font script="Telu" typeface="Gautami"/>
+        <a:font script="Taml" typeface="Latha"/>
+        <a:font script="Syrc" typeface="Estrangelo Edessa"/>
+        <a:font script="Orya" typeface="Kalinga"/>
+        <a:font script="Mlym" typeface="Kartika"/>
+        <a:font script="Laoo" typeface="DokChampa"/>
+        <a:font script="Sinh" typeface="Iskoola Pota"/>
+        <a:font script="Mong" typeface="Mongolian Baiti"/>
+        <a:font script="Viet" typeface="Times New Roman"/>
+        <a:font script="Uigh" typeface="Microsoft Uighur"/>
+        <a:font script="Geor" typeface="Sylfaen"/>
+      </a:majorFont>
+      <a:minorFont>
+        <a:latin typeface="Arial"/>
+        <a:ea typeface=""/>
+        <a:cs typeface=""/>
+        <a:font script="Jpan" typeface="ＭＳ Ｐゴシック"/>
+        <a:font script="Hang" typeface="맑은 고딕"/>
+        <a:font script="Hans" typeface="宋体"/>
+        <a:font script="Hant" typeface="新細明體"/>
+        <a:font script="Arab" typeface="Arial"/>
+        <a:font script="Hebr" typeface="Arial"/>
+        <a:font script="Thai" typeface="Cordia New"/>
+        <a:font script="Ethi" typeface="Nyala"/>
+        <a:font script="Beng" typeface="Vrinda"/>
+        <a:font script="Gujr" typeface="Shruti"/>
+        <a:font script="Khmr" typeface="DaunPenh"/>
+        <a:font script="Knda" typeface="Tunga"/>
+        <a:font script="Guru" typeface="Raavi"/>
+        <a:font script="Cans" typeface="Euphemia"/>
+        <a:font script="Cher" typeface="Plantagenet Cherokee"/>
+        <a:font script="Yiii" typeface="Microsoft Yi Baiti"/>
+        <a:font script="Tibt" typeface="Microsoft Himalaya"/>
+        <a:font script="Thaa" typeface="MV Boli"/>
+        <a:font script="Deva" typeface="Mangal"/>
+        <a:font script="Telu" typeface="Gautami"/>
+        <a:font script="Taml" typeface="Latha"/>
+        <a:font script="Syrc" typeface="Estrangelo Edessa"/>
+        <a:font script="Orya" typeface="Kalinga"/>
+        <a:font script="Mlym" typeface="Kartika"/>
+        <a:font script="Laoo" typeface="DokChampa"/>
+        <a:font script="Sinh" typeface="Iskoola Pota"/>
+        <a:font script="Mong" typeface="Mongolian Baiti"/>
+        <a:font script="Viet" typeface="Arial"/>
+        <a:font script="Uigh" typeface="Microsoft Uighur"/>
+        <a:font script="Geor" typeface="Sylfaen"/>
+      </a:minorFont>
+    </a:fontScheme>
+    <a:fmtScheme name="Office">
+      <a:fillStyleLst>
+        <a:solidFill>
+          <a:schemeClr val="phClr"/>
+        </a:solidFill>
+        <a:gradFill rotWithShape="1">
+          <a:gsLst>
+            <a:gs pos="0">
+              <a:schemeClr val="phClr">
+                <a:tint val="50000"/>
+                <a:satMod val="300000"/>
+              </a:schemeClr>
+            </a:gs>
+            <a:gs pos="35000">
+              <a:schemeClr val="phClr">
+                <a:tint val="37000"/>
+                <a:satMod val="300000"/>
+              </a:schemeClr>
+            </a:gs>
+            <a:gs pos="100000">
+              <a:schemeClr val="phClr">
+                <a:tint val="15000"/>
+                <a:satMod val="350000"/>
+              </a:schemeClr>
+            </a:gs>
+          </a:gsLst>
+          <a:lin ang="16200000" scaled="1"/>
+        </a:gradFill>
+        <a:gradFill rotWithShape="1">
+          <a:gsLst>
+            <a:gs pos="0">
+              <a:schemeClr val="phClr">
+                <a:tint val="100000"/>
+                <a:shade val="100000"/>
+                <a:satMod val="130000"/>
+              </a:schemeClr>
+            </a:gs>
+            <a:gs pos="100000">
+              <a:schemeClr val="phClr">
+                <a:tint val="50000"/>
+                <a:shade val="100000"/>
+                <a:satMod val="350000"/>
+              </a:schemeClr>
+            </a:gs>
+          </a:gsLst>
+          <a:lin ang="16200000" scaled="0"/>
+        </a:gradFill>
+      </a:fillStyleLst>
+      <a:lnStyleLst>
+        <a:ln w="9525" cap="flat" cmpd="sng" algn="ctr">
+          <a:solidFill>
+            <a:schemeClr val="phClr">
+              <a:shade val="95000"/>
+              <a:satMod val="105000"/>
+            </a:schemeClr>
+          </a:solidFill>
+          <a:prstDash val="solid"/>
+        </a:ln>
+        <a:ln w="25400" cap="flat" cmpd="sng" algn="ctr">
+          <a:solidFill>
+            <a:schemeClr val="phClr"/>
+          </a:solidFill>
+          <a:prstDash val="solid"/>
+        </a:ln>
+        <a:ln w="38100" cap="flat" cmpd="sng" algn="ctr">
+          <a:solidFill>
+            <a:schemeClr val="phClr"/>
+          </a:solidFill>
+          <a:prstDash val="solid"/>
+        </a:ln>
+      </a:lnStyleLst>
+      <a:effectStyleLst>
+        <a:effectStyle>
+          <a:effectLst>
+            <a:outerShdw blurRad="40000" dist="20000" dir="5400000" rotWithShape="0">
+              <a:srgbClr val="000000">
+                <a:alpha val="38000"/>
+              </a:srgbClr>
+            </a:outerShdw>
+          </a:effectLst>
+        </a:effectStyle>
+        <a:effectStyle>
+          <a:effectLst>
+            <a:outerShdw blurRad="40000" dist="23000" dir="5400000" rotWithShape="0">
+              <a:srgbClr val="000000">
+                <a:alpha val="35000"/>
+              </a:srgbClr>
+            </a:outerShdw>
+          </a:effectLst>
+        </a:effectStyle>
+        <a:effectStyle>
+          <a:effectLst>
+            <a:outerShdw blurRad="40000" dist="23000" dir="5400000" rotWithShape="0">
+              <a:srgbClr val="000000">
+                <a:alpha val="35000"/>
+              </a:srgbClr>
+            </a:outerShdw>
+          </a:effectLst>
+          <a:scene3d>
+            <a:camera prst="orthographicFront">
+              <a:rot lat="0" lon="0" rev="0"/>
+            </a:camera>
+            <a:lightRig rig="threePt" dir="t">
+              <a:rot lat="0" lon="0" rev="1200000"/>
+            </a:lightRig>
+          </a:scene3d>
+          <a:sp3d>
+            <a:bevelT w="63500" h="25400"/>
+          </a:sp3d>
+        </a:effectStyle>
+      </a:effectStyleLst>
+      <a:bgFillStyleLst>
+        <a:solidFill>
+          <a:schemeClr val="phClr"/>
+        </a:solidFill>
+        <a:gradFill rotWithShape="1">
+          <a:gsLst>
+            <a:gs pos="0">
+              <a:schemeClr val="phClr">
+                <a:tint val="40000"/>
+                <a:satMod val="350000"/>
+              </a:schemeClr>
+            </a:gs>
+            <a:gs pos="40000">
+              <a:schemeClr val="phClr">
+                <a:tint val="45000"/>
+                <a:shade val="99000"/>
+                <a:satMod val="350000"/>
+              </a:schemeClr>
+            </a:gs>
+            <a:gs pos="100000">
+              <a:schemeClr val="phClr">
+                <a:shade val="20000"/>
+                <a:satMod val="255000"/>
+              </a:schemeClr>
+            </a:gs>
+          </a:gsLst>
+          <a:path path="circle">
+            <a:fillToRect l="50000" t="-80000" r="50000" b="180000"/>
+          </a:path>
+        </a:gradFill>
+        <a:gradFill rotWithShape="1">
+          <a:gsLst>
+            <a:gs pos="0">
+              <a:schemeClr val="phClr">
+                <a:tint val="80000"/>
+                <a:satMod val="300000"/>
+              </a:schemeClr>
+            </a:gs>
+            <a:gs pos="100000">
+              <a:schemeClr val="phClr">
+                <a:shade val="30000"/>
+                <a:satMod val="200000"/>
+              </a:schemeClr>
+            </a:gs>
+          </a:gsLst>
+          <a:path path="circle">
+            <a:fillToRect l="50000" t="50000" r="50000" b="50000"/>
+          </a:path>
+        </a:gradFill>
+      </a:bgFillStyleLst>
+    </a:fmtScheme>
+  </a:themeElements>
+</a:theme>
+</file>
+
+<file path=ppt/theme/theme2.xml><?xml version="1.0" encoding="utf-8"?>
 <a:theme xmlns:a="http://schemas.openxmlformats.org/drawingml/2006/main" xmlns:r="http://schemas.openxmlformats.org/officeDocument/2006/relationships">
   <a:themeElements>
     <a:clrScheme name="Default">
@@ -8636,283 +8915,4 @@
     </a:fmtScheme>
   </a:themeElements>
 </a:theme>
-</file>
-
-<file path=ppt/theme/theme2.xml><?xml version="1.0" encoding="utf-8"?>
-<a:theme xmlns:a="http://schemas.openxmlformats.org/drawingml/2006/main" xmlns:r="http://schemas.openxmlformats.org/officeDocument/2006/relationships" name="Tropic">
-  <a:themeElements>
-    <a:clrScheme name="Tropic">
-      <a:dk1>
-        <a:srgbClr val="A1E8D9"/>
-      </a:dk1>
-      <a:lt1>
-        <a:srgbClr val="FFFFFF"/>
-      </a:lt1>
-      <a:dk2>
-        <a:srgbClr val="695D46"/>
-      </a:dk2>
-      <a:lt2>
-        <a:srgbClr val="B3A77D"/>
-      </a:lt2>
-      <a:accent1>
-        <a:srgbClr val="EF6C00"/>
-      </a:accent1>
-      <a:accent2>
-        <a:srgbClr val="CE93D8"/>
-      </a:accent2>
-      <a:accent3>
-        <a:srgbClr val="4DB6AC"/>
-      </a:accent3>
-      <a:accent4>
-        <a:srgbClr val="FF9800"/>
-      </a:accent4>
-      <a:accent5>
-        <a:srgbClr val="009668"/>
-      </a:accent5>
-      <a:accent6>
-        <a:srgbClr val="EEFF41"/>
-      </a:accent6>
-      <a:hlink>
-        <a:srgbClr val="009668"/>
-      </a:hlink>
-      <a:folHlink>
-        <a:srgbClr val="009668"/>
-      </a:folHlink>
-    </a:clrScheme>
-    <a:fontScheme name="Office">
-      <a:majorFont>
-        <a:latin typeface="Arial"/>
-        <a:ea typeface=""/>
-        <a:cs typeface=""/>
-        <a:font script="Jpan" typeface="ＭＳ Ｐゴシック"/>
-        <a:font script="Hang" typeface="맑은 고딕"/>
-        <a:font script="Hans" typeface="宋体"/>
-        <a:font script="Hant" typeface="新細明體"/>
-        <a:font script="Arab" typeface="Times New Roman"/>
-        <a:font script="Hebr" typeface="Times New Roman"/>
-        <a:font script="Thai" typeface="Angsana New"/>
-        <a:font script="Ethi" typeface="Nyala"/>
-        <a:font script="Beng" typeface="Vrinda"/>
-        <a:font script="Gujr" typeface="Shruti"/>
-        <a:font script="Khmr" typeface="MoolBoran"/>
-        <a:font script="Knda" typeface="Tunga"/>
-        <a:font script="Guru" typeface="Raavi"/>
-        <a:font script="Cans" typeface="Euphemia"/>
-        <a:font script="Cher" typeface="Plantagenet Cherokee"/>
-        <a:font script="Yiii" typeface="Microsoft Yi Baiti"/>
-        <a:font script="Tibt" typeface="Microsoft Himalaya"/>
-        <a:font script="Thaa" typeface="MV Boli"/>
-        <a:font script="Deva" typeface="Mangal"/>
-        <a:font script="Telu" typeface="Gautami"/>
-        <a:font script="Taml" typeface="Latha"/>
-        <a:font script="Syrc" typeface="Estrangelo Edessa"/>
-        <a:font script="Orya" typeface="Kalinga"/>
-        <a:font script="Mlym" typeface="Kartika"/>
-        <a:font script="Laoo" typeface="DokChampa"/>
-        <a:font script="Sinh" typeface="Iskoola Pota"/>
-        <a:font script="Mong" typeface="Mongolian Baiti"/>
-        <a:font script="Viet" typeface="Times New Roman"/>
-        <a:font script="Uigh" typeface="Microsoft Uighur"/>
-        <a:font script="Geor" typeface="Sylfaen"/>
-      </a:majorFont>
-      <a:minorFont>
-        <a:latin typeface="Arial"/>
-        <a:ea typeface=""/>
-        <a:cs typeface=""/>
-        <a:font script="Jpan" typeface="ＭＳ Ｐゴシック"/>
-        <a:font script="Hang" typeface="맑은 고딕"/>
-        <a:font script="Hans" typeface="宋体"/>
-        <a:font script="Hant" typeface="新細明體"/>
-        <a:font script="Arab" typeface="Arial"/>
-        <a:font script="Hebr" typeface="Arial"/>
-        <a:font script="Thai" typeface="Cordia New"/>
-        <a:font script="Ethi" typeface="Nyala"/>
-        <a:font script="Beng" typeface="Vrinda"/>
-        <a:font script="Gujr" typeface="Shruti"/>
-        <a:font script="Khmr" typeface="DaunPenh"/>
-        <a:font script="Knda" typeface="Tunga"/>
-        <a:font script="Guru" typeface="Raavi"/>
-        <a:font script="Cans" typeface="Euphemia"/>
-        <a:font script="Cher" typeface="Plantagenet Cherokee"/>
-        <a:font script="Yiii" typeface="Microsoft Yi Baiti"/>
-        <a:font script="Tibt" typeface="Microsoft Himalaya"/>
-        <a:font script="Thaa" typeface="MV Boli"/>
-        <a:font script="Deva" typeface="Mangal"/>
-        <a:font script="Telu" typeface="Gautami"/>
-        <a:font script="Taml" typeface="Latha"/>
-        <a:font script="Syrc" typeface="Estrangelo Edessa"/>
-        <a:font script="Orya" typeface="Kalinga"/>
-        <a:font script="Mlym" typeface="Kartika"/>
-        <a:font script="Laoo" typeface="DokChampa"/>
-        <a:font script="Sinh" typeface="Iskoola Pota"/>
-        <a:font script="Mong" typeface="Mongolian Baiti"/>
-        <a:font script="Viet" typeface="Arial"/>
-        <a:font script="Uigh" typeface="Microsoft Uighur"/>
-        <a:font script="Geor" typeface="Sylfaen"/>
-      </a:minorFont>
-    </a:fontScheme>
-    <a:fmtScheme name="Office">
-      <a:fillStyleLst>
-        <a:solidFill>
-          <a:schemeClr val="phClr"/>
-        </a:solidFill>
-        <a:gradFill rotWithShape="1">
-          <a:gsLst>
-            <a:gs pos="0">
-              <a:schemeClr val="phClr">
-                <a:tint val="50000"/>
-                <a:satMod val="300000"/>
-              </a:schemeClr>
-            </a:gs>
-            <a:gs pos="35000">
-              <a:schemeClr val="phClr">
-                <a:tint val="37000"/>
-                <a:satMod val="300000"/>
-              </a:schemeClr>
-            </a:gs>
-            <a:gs pos="100000">
-              <a:schemeClr val="phClr">
-                <a:tint val="15000"/>
-                <a:satMod val="350000"/>
-              </a:schemeClr>
-            </a:gs>
-          </a:gsLst>
-          <a:lin ang="16200000" scaled="1"/>
-        </a:gradFill>
-        <a:gradFill rotWithShape="1">
-          <a:gsLst>
-            <a:gs pos="0">
-              <a:schemeClr val="phClr">
-                <a:tint val="100000"/>
-                <a:shade val="100000"/>
-                <a:satMod val="130000"/>
-              </a:schemeClr>
-            </a:gs>
-            <a:gs pos="100000">
-              <a:schemeClr val="phClr">
-                <a:tint val="50000"/>
-                <a:shade val="100000"/>
-                <a:satMod val="350000"/>
-              </a:schemeClr>
-            </a:gs>
-          </a:gsLst>
-          <a:lin ang="16200000" scaled="0"/>
-        </a:gradFill>
-      </a:fillStyleLst>
-      <a:lnStyleLst>
-        <a:ln w="9525" cap="flat" cmpd="sng" algn="ctr">
-          <a:solidFill>
-            <a:schemeClr val="phClr">
-              <a:shade val="95000"/>
-              <a:satMod val="105000"/>
-            </a:schemeClr>
-          </a:solidFill>
-          <a:prstDash val="solid"/>
-        </a:ln>
-        <a:ln w="25400" cap="flat" cmpd="sng" algn="ctr">
-          <a:solidFill>
-            <a:schemeClr val="phClr"/>
-          </a:solidFill>
-          <a:prstDash val="solid"/>
-        </a:ln>
-        <a:ln w="38100" cap="flat" cmpd="sng" algn="ctr">
-          <a:solidFill>
-            <a:schemeClr val="phClr"/>
-          </a:solidFill>
-          <a:prstDash val="solid"/>
-        </a:ln>
-      </a:lnStyleLst>
-      <a:effectStyleLst>
-        <a:effectStyle>
-          <a:effectLst>
-            <a:outerShdw blurRad="40000" dist="20000" dir="5400000" rotWithShape="0">
-              <a:srgbClr val="000000">
-                <a:alpha val="38000"/>
-              </a:srgbClr>
-            </a:outerShdw>
-          </a:effectLst>
-        </a:effectStyle>
-        <a:effectStyle>
-          <a:effectLst>
-            <a:outerShdw blurRad="40000" dist="23000" dir="5400000" rotWithShape="0">
-              <a:srgbClr val="000000">
-                <a:alpha val="35000"/>
-              </a:srgbClr>
-            </a:outerShdw>
-          </a:effectLst>
-        </a:effectStyle>
-        <a:effectStyle>
-          <a:effectLst>
-            <a:outerShdw blurRad="40000" dist="23000" dir="5400000" rotWithShape="0">
-              <a:srgbClr val="000000">
-                <a:alpha val="35000"/>
-              </a:srgbClr>
-            </a:outerShdw>
-          </a:effectLst>
-          <a:scene3d>
-            <a:camera prst="orthographicFront">
-              <a:rot lat="0" lon="0" rev="0"/>
-            </a:camera>
-            <a:lightRig rig="threePt" dir="t">
-              <a:rot lat="0" lon="0" rev="1200000"/>
-            </a:lightRig>
-          </a:scene3d>
-          <a:sp3d>
-            <a:bevelT w="63500" h="25400"/>
-          </a:sp3d>
-        </a:effectStyle>
-      </a:effectStyleLst>
-      <a:bgFillStyleLst>
-        <a:solidFill>
-          <a:schemeClr val="phClr"/>
-        </a:solidFill>
-        <a:gradFill rotWithShape="1">
-          <a:gsLst>
-            <a:gs pos="0">
-              <a:schemeClr val="phClr">
-                <a:tint val="40000"/>
-                <a:satMod val="350000"/>
-              </a:schemeClr>
-            </a:gs>
-            <a:gs pos="40000">
-              <a:schemeClr val="phClr">
-                <a:tint val="45000"/>
-                <a:shade val="99000"/>
-                <a:satMod val="350000"/>
-              </a:schemeClr>
-            </a:gs>
-            <a:gs pos="100000">
-              <a:schemeClr val="phClr">
-                <a:shade val="20000"/>
-                <a:satMod val="255000"/>
-              </a:schemeClr>
-            </a:gs>
-          </a:gsLst>
-          <a:path path="circle">
-            <a:fillToRect l="50000" t="-80000" r="50000" b="180000"/>
-          </a:path>
-        </a:gradFill>
-        <a:gradFill rotWithShape="1">
-          <a:gsLst>
-            <a:gs pos="0">
-              <a:schemeClr val="phClr">
-                <a:tint val="80000"/>
-                <a:satMod val="300000"/>
-              </a:schemeClr>
-            </a:gs>
-            <a:gs pos="100000">
-              <a:schemeClr val="phClr">
-                <a:shade val="30000"/>
-                <a:satMod val="200000"/>
-              </a:schemeClr>
-            </a:gs>
-          </a:gsLst>
-          <a:path path="circle">
-            <a:fillToRect l="50000" t="50000" r="50000" b="50000"/>
-          </a:path>
-        </a:gradFill>
-      </a:bgFillStyleLst>
-    </a:fmtScheme>
-  </a:themeElements>
-</a:theme>
 </file>
</xml_diff>